<commit_message>
chg: Updated  VIS instructions
</commit_message>
<xml_diff>
--- a/VIS WORKSPACE/VIS INTREP template.pptx
+++ b/VIS WORKSPACE/VIS INTREP template.pptx
@@ -194,7 +194,7 @@
             <a:fld id="{40637A30-8EE1-4060-9976-8832FC89EE34}" type="datetimeFigureOut">
               <a:rPr lang="nb-NO" smtClean="0"/>
               <a:pPr/>
-              <a:t>27.04.2020</a:t>
+              <a:t>06.05.2020</a:t>
             </a:fld>
             <a:endParaRPr lang="nb-NO"/>
           </a:p>
@@ -4038,8 +4038,19 @@
                 <a:latin typeface="Arial Black" pitchFamily="34" charset="0"/>
                 <a:ea typeface="MS Mincho" pitchFamily="49" charset="-128"/>
               </a:rPr>
-              <a:t>INTREP XX-XXX</a:t>
-            </a:r>
+              <a:t>INTREP </a:t>
+            </a:r>
+            <a:r>
+              <a:rPr lang="nb-NO" sz="2800" b="1" dirty="0" smtClean="0">
+                <a:latin typeface="Arial Black" pitchFamily="34" charset="0"/>
+                <a:ea typeface="MS Mincho" pitchFamily="49" charset="-128"/>
+              </a:rPr>
+              <a:t>VIS-XX-XXX</a:t>
+            </a:r>
+            <a:endParaRPr lang="nb-NO" sz="2800" b="1" dirty="0" smtClean="0">
+              <a:latin typeface="Arial Black" pitchFamily="34" charset="0"/>
+              <a:ea typeface="MS Mincho" pitchFamily="49" charset="-128"/>
+            </a:endParaRPr>
           </a:p>
           <a:p>
             <a:pPr algn="ctr"/>

</xml_diff>